<commit_message>
Spell Laurie Williams and Chris Parnin correctly. Fix capitalization in headings.
</commit_message>
<xml_diff>
--- a/img/bookmark.pptx
+++ b/img/bookmark.pptx
@@ -107,6 +107,14 @@
       </a:defRPr>
     </a:lvl9pPr>
   </p:defaultTextStyle>
+  <p:extLst>
+    <p:ext uri="{EFAFB233-063F-42B5-8137-9DF3F51BA10A}">
+      <p15:sldGuideLst xmlns:p15="http://schemas.microsoft.com/office/powerpoint/2012/main"/>
+    </p:ext>
+    <p:ext uri="{2D200454-40CA-4A62-9FC3-DE9A4176ACB9}">
+      <p15:notesGuideLst xmlns:p15="http://schemas.microsoft.com/office/powerpoint/2012/main"/>
+    </p:ext>
+  </p:extLst>
 </p:presentation>
 </file>
 
@@ -192,7 +200,7 @@
           <a:p>
             <a:fld id="{46F07AF3-871D-6C4A-8794-EA70F00191D8}" type="datetimeFigureOut">
               <a:rPr lang="en-US" smtClean="0"/>
-              <a:t>4/19/16</a:t>
+              <a:t>4/19/2016</a:t>
             </a:fld>
             <a:endParaRPr lang="en-US"/>
           </a:p>
@@ -256,38 +264,37 @@
           <a:p>
             <a:pPr lvl="0"/>
             <a:r>
-              <a:rPr lang="en-US" smtClean="0"/>
+              <a:rPr lang="en-US"/>
               <a:t>Click to edit Master text styles</a:t>
             </a:r>
           </a:p>
           <a:p>
             <a:pPr lvl="1"/>
             <a:r>
-              <a:rPr lang="en-US" smtClean="0"/>
+              <a:rPr lang="en-US"/>
               <a:t>Second level</a:t>
             </a:r>
           </a:p>
           <a:p>
             <a:pPr lvl="2"/>
             <a:r>
-              <a:rPr lang="en-US" smtClean="0"/>
+              <a:rPr lang="en-US"/>
               <a:t>Third level</a:t>
             </a:r>
           </a:p>
           <a:p>
             <a:pPr lvl="3"/>
             <a:r>
-              <a:rPr lang="en-US" smtClean="0"/>
+              <a:rPr lang="en-US"/>
               <a:t>Fourth level</a:t>
             </a:r>
           </a:p>
           <a:p>
             <a:pPr lvl="4"/>
             <a:r>
-              <a:rPr lang="en-US" smtClean="0"/>
+              <a:rPr lang="en-US"/>
               <a:t>Fifth level</a:t>
             </a:r>
-            <a:endParaRPr lang="en-US"/>
           </a:p>
         </p:txBody>
       </p:sp>
@@ -586,10 +593,9 @@
           </a:lstStyle>
           <a:p>
             <a:r>
-              <a:rPr lang="en-US" smtClean="0"/>
+              <a:rPr lang="en-US"/>
               <a:t>Click to edit Master title style</a:t>
             </a:r>
-            <a:endParaRPr lang="en-US"/>
           </a:p>
         </p:txBody>
       </p:sp>
@@ -651,10 +657,9 @@
           </a:lstStyle>
           <a:p>
             <a:r>
-              <a:rPr lang="en-US" smtClean="0"/>
+              <a:rPr lang="en-US"/>
               <a:t>Click to edit Master subtitle style</a:t>
             </a:r>
-            <a:endParaRPr lang="en-US"/>
           </a:p>
         </p:txBody>
       </p:sp>
@@ -675,7 +680,7 @@
           <a:p>
             <a:fld id="{B540673F-1357-9443-ADCA-90B5455D5376}" type="datetimeFigureOut">
               <a:rPr lang="en-US" smtClean="0"/>
-              <a:t>4/19/16</a:t>
+              <a:t>4/19/2016</a:t>
             </a:fld>
             <a:endParaRPr lang="en-US"/>
           </a:p>
@@ -769,10 +774,9 @@
           <a:lstStyle/>
           <a:p>
             <a:r>
-              <a:rPr lang="en-US" smtClean="0"/>
+              <a:rPr lang="en-US"/>
               <a:t>Click to edit Master title style</a:t>
             </a:r>
-            <a:endParaRPr lang="en-US"/>
           </a:p>
         </p:txBody>
       </p:sp>
@@ -793,38 +797,37 @@
           <a:p>
             <a:pPr lvl="0"/>
             <a:r>
-              <a:rPr lang="en-US" smtClean="0"/>
+              <a:rPr lang="en-US"/>
               <a:t>Click to edit Master text styles</a:t>
             </a:r>
           </a:p>
           <a:p>
             <a:pPr lvl="1"/>
             <a:r>
-              <a:rPr lang="en-US" smtClean="0"/>
+              <a:rPr lang="en-US"/>
               <a:t>Second level</a:t>
             </a:r>
           </a:p>
           <a:p>
             <a:pPr lvl="2"/>
             <a:r>
-              <a:rPr lang="en-US" smtClean="0"/>
+              <a:rPr lang="en-US"/>
               <a:t>Third level</a:t>
             </a:r>
           </a:p>
           <a:p>
             <a:pPr lvl="3"/>
             <a:r>
-              <a:rPr lang="en-US" smtClean="0"/>
+              <a:rPr lang="en-US"/>
               <a:t>Fourth level</a:t>
             </a:r>
           </a:p>
           <a:p>
             <a:pPr lvl="4"/>
             <a:r>
-              <a:rPr lang="en-US" smtClean="0"/>
+              <a:rPr lang="en-US"/>
               <a:t>Fifth level</a:t>
             </a:r>
-            <a:endParaRPr lang="en-US"/>
           </a:p>
         </p:txBody>
       </p:sp>
@@ -845,7 +848,7 @@
           <a:p>
             <a:fld id="{B540673F-1357-9443-ADCA-90B5455D5376}" type="datetimeFigureOut">
               <a:rPr lang="en-US" smtClean="0"/>
-              <a:t>4/19/16</a:t>
+              <a:t>4/19/2016</a:t>
             </a:fld>
             <a:endParaRPr lang="en-US"/>
           </a:p>
@@ -944,10 +947,9 @@
           <a:lstStyle/>
           <a:p>
             <a:r>
-              <a:rPr lang="en-US" smtClean="0"/>
+              <a:rPr lang="en-US"/>
               <a:t>Click to edit Master title style</a:t>
             </a:r>
-            <a:endParaRPr lang="en-US"/>
           </a:p>
         </p:txBody>
       </p:sp>
@@ -973,38 +975,37 @@
           <a:p>
             <a:pPr lvl="0"/>
             <a:r>
-              <a:rPr lang="en-US" smtClean="0"/>
+              <a:rPr lang="en-US"/>
               <a:t>Click to edit Master text styles</a:t>
             </a:r>
           </a:p>
           <a:p>
             <a:pPr lvl="1"/>
             <a:r>
-              <a:rPr lang="en-US" smtClean="0"/>
+              <a:rPr lang="en-US"/>
               <a:t>Second level</a:t>
             </a:r>
           </a:p>
           <a:p>
             <a:pPr lvl="2"/>
             <a:r>
-              <a:rPr lang="en-US" smtClean="0"/>
+              <a:rPr lang="en-US"/>
               <a:t>Third level</a:t>
             </a:r>
           </a:p>
           <a:p>
             <a:pPr lvl="3"/>
             <a:r>
-              <a:rPr lang="en-US" smtClean="0"/>
+              <a:rPr lang="en-US"/>
               <a:t>Fourth level</a:t>
             </a:r>
           </a:p>
           <a:p>
             <a:pPr lvl="4"/>
             <a:r>
-              <a:rPr lang="en-US" smtClean="0"/>
+              <a:rPr lang="en-US"/>
               <a:t>Fifth level</a:t>
             </a:r>
-            <a:endParaRPr lang="en-US"/>
           </a:p>
         </p:txBody>
       </p:sp>
@@ -1025,7 +1026,7 @@
           <a:p>
             <a:fld id="{B540673F-1357-9443-ADCA-90B5455D5376}" type="datetimeFigureOut">
               <a:rPr lang="en-US" smtClean="0"/>
-              <a:t>4/19/16</a:t>
+              <a:t>4/19/2016</a:t>
             </a:fld>
             <a:endParaRPr lang="en-US"/>
           </a:p>
@@ -1119,10 +1120,9 @@
           <a:lstStyle/>
           <a:p>
             <a:r>
-              <a:rPr lang="en-US" smtClean="0"/>
+              <a:rPr lang="en-US"/>
               <a:t>Click to edit Master title style</a:t>
             </a:r>
-            <a:endParaRPr lang="en-US"/>
           </a:p>
         </p:txBody>
       </p:sp>
@@ -1143,38 +1143,37 @@
           <a:p>
             <a:pPr lvl="0"/>
             <a:r>
-              <a:rPr lang="en-US" smtClean="0"/>
+              <a:rPr lang="en-US"/>
               <a:t>Click to edit Master text styles</a:t>
             </a:r>
           </a:p>
           <a:p>
             <a:pPr lvl="1"/>
             <a:r>
-              <a:rPr lang="en-US" smtClean="0"/>
+              <a:rPr lang="en-US"/>
               <a:t>Second level</a:t>
             </a:r>
           </a:p>
           <a:p>
             <a:pPr lvl="2"/>
             <a:r>
-              <a:rPr lang="en-US" smtClean="0"/>
+              <a:rPr lang="en-US"/>
               <a:t>Third level</a:t>
             </a:r>
           </a:p>
           <a:p>
             <a:pPr lvl="3"/>
             <a:r>
-              <a:rPr lang="en-US" smtClean="0"/>
+              <a:rPr lang="en-US"/>
               <a:t>Fourth level</a:t>
             </a:r>
           </a:p>
           <a:p>
             <a:pPr lvl="4"/>
             <a:r>
-              <a:rPr lang="en-US" smtClean="0"/>
+              <a:rPr lang="en-US"/>
               <a:t>Fifth level</a:t>
             </a:r>
-            <a:endParaRPr lang="en-US"/>
           </a:p>
         </p:txBody>
       </p:sp>
@@ -1195,7 +1194,7 @@
           <a:p>
             <a:fld id="{B540673F-1357-9443-ADCA-90B5455D5376}" type="datetimeFigureOut">
               <a:rPr lang="en-US" smtClean="0"/>
-              <a:t>4/19/16</a:t>
+              <a:t>4/19/2016</a:t>
             </a:fld>
             <a:endParaRPr lang="en-US"/>
           </a:p>
@@ -1298,10 +1297,9 @@
           </a:lstStyle>
           <a:p>
             <a:r>
-              <a:rPr lang="en-US" smtClean="0"/>
+              <a:rPr lang="en-US"/>
               <a:t>Click to edit Master title style</a:t>
             </a:r>
-            <a:endParaRPr lang="en-US"/>
           </a:p>
         </p:txBody>
       </p:sp>
@@ -1418,7 +1416,7 @@
           <a:p>
             <a:pPr lvl="0"/>
             <a:r>
-              <a:rPr lang="en-US" smtClean="0"/>
+              <a:rPr lang="en-US"/>
               <a:t>Click to edit Master text styles</a:t>
             </a:r>
           </a:p>
@@ -1441,7 +1439,7 @@
           <a:p>
             <a:fld id="{B540673F-1357-9443-ADCA-90B5455D5376}" type="datetimeFigureOut">
               <a:rPr lang="en-US" smtClean="0"/>
-              <a:t>4/19/16</a:t>
+              <a:t>4/19/2016</a:t>
             </a:fld>
             <a:endParaRPr lang="en-US"/>
           </a:p>
@@ -1535,10 +1533,9 @@
           <a:lstStyle/>
           <a:p>
             <a:r>
-              <a:rPr lang="en-US" smtClean="0"/>
+              <a:rPr lang="en-US"/>
               <a:t>Click to edit Master title style</a:t>
             </a:r>
-            <a:endParaRPr lang="en-US"/>
           </a:p>
         </p:txBody>
       </p:sp>
@@ -1564,38 +1561,37 @@
           <a:p>
             <a:pPr lvl="0"/>
             <a:r>
-              <a:rPr lang="en-US" smtClean="0"/>
+              <a:rPr lang="en-US"/>
               <a:t>Click to edit Master text styles</a:t>
             </a:r>
           </a:p>
           <a:p>
             <a:pPr lvl="1"/>
             <a:r>
-              <a:rPr lang="en-US" smtClean="0"/>
+              <a:rPr lang="en-US"/>
               <a:t>Second level</a:t>
             </a:r>
           </a:p>
           <a:p>
             <a:pPr lvl="2"/>
             <a:r>
-              <a:rPr lang="en-US" smtClean="0"/>
+              <a:rPr lang="en-US"/>
               <a:t>Third level</a:t>
             </a:r>
           </a:p>
           <a:p>
             <a:pPr lvl="3"/>
             <a:r>
-              <a:rPr lang="en-US" smtClean="0"/>
+              <a:rPr lang="en-US"/>
               <a:t>Fourth level</a:t>
             </a:r>
           </a:p>
           <a:p>
             <a:pPr lvl="4"/>
             <a:r>
-              <a:rPr lang="en-US" smtClean="0"/>
+              <a:rPr lang="en-US"/>
               <a:t>Fifth level</a:t>
             </a:r>
-            <a:endParaRPr lang="en-US"/>
           </a:p>
         </p:txBody>
       </p:sp>
@@ -1621,38 +1617,37 @@
           <a:p>
             <a:pPr lvl="0"/>
             <a:r>
-              <a:rPr lang="en-US" smtClean="0"/>
+              <a:rPr lang="en-US"/>
               <a:t>Click to edit Master text styles</a:t>
             </a:r>
           </a:p>
           <a:p>
             <a:pPr lvl="1"/>
             <a:r>
-              <a:rPr lang="en-US" smtClean="0"/>
+              <a:rPr lang="en-US"/>
               <a:t>Second level</a:t>
             </a:r>
           </a:p>
           <a:p>
             <a:pPr lvl="2"/>
             <a:r>
-              <a:rPr lang="en-US" smtClean="0"/>
+              <a:rPr lang="en-US"/>
               <a:t>Third level</a:t>
             </a:r>
           </a:p>
           <a:p>
             <a:pPr lvl="3"/>
             <a:r>
-              <a:rPr lang="en-US" smtClean="0"/>
+              <a:rPr lang="en-US"/>
               <a:t>Fourth level</a:t>
             </a:r>
           </a:p>
           <a:p>
             <a:pPr lvl="4"/>
             <a:r>
-              <a:rPr lang="en-US" smtClean="0"/>
+              <a:rPr lang="en-US"/>
               <a:t>Fifth level</a:t>
             </a:r>
-            <a:endParaRPr lang="en-US"/>
           </a:p>
         </p:txBody>
       </p:sp>
@@ -1673,7 +1668,7 @@
           <a:p>
             <a:fld id="{B540673F-1357-9443-ADCA-90B5455D5376}" type="datetimeFigureOut">
               <a:rPr lang="en-US" smtClean="0"/>
-              <a:t>4/19/16</a:t>
+              <a:t>4/19/2016</a:t>
             </a:fld>
             <a:endParaRPr lang="en-US"/>
           </a:p>
@@ -1772,10 +1767,9 @@
           <a:lstStyle/>
           <a:p>
             <a:r>
-              <a:rPr lang="en-US" smtClean="0"/>
+              <a:rPr lang="en-US"/>
               <a:t>Click to edit Master title style</a:t>
             </a:r>
-            <a:endParaRPr lang="en-US"/>
           </a:p>
         </p:txBody>
       </p:sp>
@@ -1838,7 +1832,7 @@
           <a:p>
             <a:pPr lvl="0"/>
             <a:r>
-              <a:rPr lang="en-US" smtClean="0"/>
+              <a:rPr lang="en-US"/>
               <a:t>Click to edit Master text styles</a:t>
             </a:r>
           </a:p>
@@ -1866,38 +1860,37 @@
           <a:p>
             <a:pPr lvl="0"/>
             <a:r>
-              <a:rPr lang="en-US" smtClean="0"/>
+              <a:rPr lang="en-US"/>
               <a:t>Click to edit Master text styles</a:t>
             </a:r>
           </a:p>
           <a:p>
             <a:pPr lvl="1"/>
             <a:r>
-              <a:rPr lang="en-US" smtClean="0"/>
+              <a:rPr lang="en-US"/>
               <a:t>Second level</a:t>
             </a:r>
           </a:p>
           <a:p>
             <a:pPr lvl="2"/>
             <a:r>
-              <a:rPr lang="en-US" smtClean="0"/>
+              <a:rPr lang="en-US"/>
               <a:t>Third level</a:t>
             </a:r>
           </a:p>
           <a:p>
             <a:pPr lvl="3"/>
             <a:r>
-              <a:rPr lang="en-US" smtClean="0"/>
+              <a:rPr lang="en-US"/>
               <a:t>Fourth level</a:t>
             </a:r>
           </a:p>
           <a:p>
             <a:pPr lvl="4"/>
             <a:r>
-              <a:rPr lang="en-US" smtClean="0"/>
+              <a:rPr lang="en-US"/>
               <a:t>Fifth level</a:t>
             </a:r>
-            <a:endParaRPr lang="en-US"/>
           </a:p>
         </p:txBody>
       </p:sp>
@@ -1960,7 +1953,7 @@
           <a:p>
             <a:pPr lvl="0"/>
             <a:r>
-              <a:rPr lang="en-US" smtClean="0"/>
+              <a:rPr lang="en-US"/>
               <a:t>Click to edit Master text styles</a:t>
             </a:r>
           </a:p>
@@ -1988,38 +1981,37 @@
           <a:p>
             <a:pPr lvl="0"/>
             <a:r>
-              <a:rPr lang="en-US" smtClean="0"/>
+              <a:rPr lang="en-US"/>
               <a:t>Click to edit Master text styles</a:t>
             </a:r>
           </a:p>
           <a:p>
             <a:pPr lvl="1"/>
             <a:r>
-              <a:rPr lang="en-US" smtClean="0"/>
+              <a:rPr lang="en-US"/>
               <a:t>Second level</a:t>
             </a:r>
           </a:p>
           <a:p>
             <a:pPr lvl="2"/>
             <a:r>
-              <a:rPr lang="en-US" smtClean="0"/>
+              <a:rPr lang="en-US"/>
               <a:t>Third level</a:t>
             </a:r>
           </a:p>
           <a:p>
             <a:pPr lvl="3"/>
             <a:r>
-              <a:rPr lang="en-US" smtClean="0"/>
+              <a:rPr lang="en-US"/>
               <a:t>Fourth level</a:t>
             </a:r>
           </a:p>
           <a:p>
             <a:pPr lvl="4"/>
             <a:r>
-              <a:rPr lang="en-US" smtClean="0"/>
+              <a:rPr lang="en-US"/>
               <a:t>Fifth level</a:t>
             </a:r>
-            <a:endParaRPr lang="en-US"/>
           </a:p>
         </p:txBody>
       </p:sp>
@@ -2040,7 +2032,7 @@
           <a:p>
             <a:fld id="{B540673F-1357-9443-ADCA-90B5455D5376}" type="datetimeFigureOut">
               <a:rPr lang="en-US" smtClean="0"/>
-              <a:t>4/19/16</a:t>
+              <a:t>4/19/2016</a:t>
             </a:fld>
             <a:endParaRPr lang="en-US"/>
           </a:p>
@@ -2134,10 +2126,9 @@
           <a:lstStyle/>
           <a:p>
             <a:r>
-              <a:rPr lang="en-US" smtClean="0"/>
+              <a:rPr lang="en-US"/>
               <a:t>Click to edit Master title style</a:t>
             </a:r>
-            <a:endParaRPr lang="en-US"/>
           </a:p>
         </p:txBody>
       </p:sp>
@@ -2158,7 +2149,7 @@
           <a:p>
             <a:fld id="{B540673F-1357-9443-ADCA-90B5455D5376}" type="datetimeFigureOut">
               <a:rPr lang="en-US" smtClean="0"/>
-              <a:t>4/19/16</a:t>
+              <a:t>4/19/2016</a:t>
             </a:fld>
             <a:endParaRPr lang="en-US"/>
           </a:p>
@@ -2253,7 +2244,7 @@
           <a:p>
             <a:fld id="{B540673F-1357-9443-ADCA-90B5455D5376}" type="datetimeFigureOut">
               <a:rPr lang="en-US" smtClean="0"/>
-              <a:t>4/19/16</a:t>
+              <a:t>4/19/2016</a:t>
             </a:fld>
             <a:endParaRPr lang="en-US"/>
           </a:p>
@@ -2356,10 +2347,9 @@
           </a:lstStyle>
           <a:p>
             <a:r>
-              <a:rPr lang="en-US" smtClean="0"/>
+              <a:rPr lang="en-US"/>
               <a:t>Click to edit Master title style</a:t>
             </a:r>
-            <a:endParaRPr lang="en-US"/>
           </a:p>
         </p:txBody>
       </p:sp>
@@ -2413,38 +2403,37 @@
           <a:p>
             <a:pPr lvl="0"/>
             <a:r>
-              <a:rPr lang="en-US" smtClean="0"/>
+              <a:rPr lang="en-US"/>
               <a:t>Click to edit Master text styles</a:t>
             </a:r>
           </a:p>
           <a:p>
             <a:pPr lvl="1"/>
             <a:r>
-              <a:rPr lang="en-US" smtClean="0"/>
+              <a:rPr lang="en-US"/>
               <a:t>Second level</a:t>
             </a:r>
           </a:p>
           <a:p>
             <a:pPr lvl="2"/>
             <a:r>
-              <a:rPr lang="en-US" smtClean="0"/>
+              <a:rPr lang="en-US"/>
               <a:t>Third level</a:t>
             </a:r>
           </a:p>
           <a:p>
             <a:pPr lvl="3"/>
             <a:r>
-              <a:rPr lang="en-US" smtClean="0"/>
+              <a:rPr lang="en-US"/>
               <a:t>Fourth level</a:t>
             </a:r>
           </a:p>
           <a:p>
             <a:pPr lvl="4"/>
             <a:r>
-              <a:rPr lang="en-US" smtClean="0"/>
+              <a:rPr lang="en-US"/>
               <a:t>Fifth level</a:t>
             </a:r>
-            <a:endParaRPr lang="en-US"/>
           </a:p>
         </p:txBody>
       </p:sp>
@@ -2507,7 +2496,7 @@
           <a:p>
             <a:pPr lvl="0"/>
             <a:r>
-              <a:rPr lang="en-US" smtClean="0"/>
+              <a:rPr lang="en-US"/>
               <a:t>Click to edit Master text styles</a:t>
             </a:r>
           </a:p>
@@ -2530,7 +2519,7 @@
           <a:p>
             <a:fld id="{B540673F-1357-9443-ADCA-90B5455D5376}" type="datetimeFigureOut">
               <a:rPr lang="en-US" smtClean="0"/>
-              <a:t>4/19/16</a:t>
+              <a:t>4/19/2016</a:t>
             </a:fld>
             <a:endParaRPr lang="en-US"/>
           </a:p>
@@ -2633,10 +2622,9 @@
           </a:lstStyle>
           <a:p>
             <a:r>
-              <a:rPr lang="en-US" smtClean="0"/>
+              <a:rPr lang="en-US"/>
               <a:t>Click to edit Master title style</a:t>
             </a:r>
-            <a:endParaRPr lang="en-US"/>
           </a:p>
         </p:txBody>
       </p:sp>
@@ -2760,7 +2748,7 @@
           <a:p>
             <a:pPr lvl="0"/>
             <a:r>
-              <a:rPr lang="en-US" smtClean="0"/>
+              <a:rPr lang="en-US"/>
               <a:t>Click to edit Master text styles</a:t>
             </a:r>
           </a:p>
@@ -2783,7 +2771,7 @@
           <a:p>
             <a:fld id="{B540673F-1357-9443-ADCA-90B5455D5376}" type="datetimeFigureOut">
               <a:rPr lang="en-US" smtClean="0"/>
-              <a:t>4/19/16</a:t>
+              <a:t>4/19/2016</a:t>
             </a:fld>
             <a:endParaRPr lang="en-US"/>
           </a:p>
@@ -2892,10 +2880,9 @@
           <a:lstStyle/>
           <a:p>
             <a:r>
-              <a:rPr lang="en-US" smtClean="0"/>
+              <a:rPr lang="en-US"/>
               <a:t>Click to edit Master title style</a:t>
             </a:r>
-            <a:endParaRPr lang="en-US"/>
           </a:p>
         </p:txBody>
       </p:sp>
@@ -2926,38 +2913,37 @@
           <a:p>
             <a:pPr lvl="0"/>
             <a:r>
-              <a:rPr lang="en-US" smtClean="0"/>
+              <a:rPr lang="en-US"/>
               <a:t>Click to edit Master text styles</a:t>
             </a:r>
           </a:p>
           <a:p>
             <a:pPr lvl="1"/>
             <a:r>
-              <a:rPr lang="en-US" smtClean="0"/>
+              <a:rPr lang="en-US"/>
               <a:t>Second level</a:t>
             </a:r>
           </a:p>
           <a:p>
             <a:pPr lvl="2"/>
             <a:r>
-              <a:rPr lang="en-US" smtClean="0"/>
+              <a:rPr lang="en-US"/>
               <a:t>Third level</a:t>
             </a:r>
           </a:p>
           <a:p>
             <a:pPr lvl="3"/>
             <a:r>
-              <a:rPr lang="en-US" smtClean="0"/>
+              <a:rPr lang="en-US"/>
               <a:t>Fourth level</a:t>
             </a:r>
           </a:p>
           <a:p>
             <a:pPr lvl="4"/>
             <a:r>
-              <a:rPr lang="en-US" smtClean="0"/>
+              <a:rPr lang="en-US"/>
               <a:t>Fifth level</a:t>
             </a:r>
-            <a:endParaRPr lang="en-US"/>
           </a:p>
         </p:txBody>
       </p:sp>
@@ -2996,7 +2982,7 @@
           <a:p>
             <a:fld id="{B540673F-1357-9443-ADCA-90B5455D5376}" type="datetimeFigureOut">
               <a:rPr lang="en-US" smtClean="0"/>
-              <a:t>4/19/16</a:t>
+              <a:t>4/19/2016</a:t>
             </a:fld>
             <a:endParaRPr lang="en-US"/>
           </a:p>
@@ -3449,7 +3435,7 @@
           </a:lstStyle>
           <a:p>
             <a:r>
-              <a:rPr lang="en-US" smtClean="0"/>
+              <a:rPr lang="en-US"/>
               <a:t> </a:t>
             </a:r>
             <a:endParaRPr lang="en-US" dirty="0"/>
@@ -3495,10 +3481,9 @@
           <a:lstStyle/>
           <a:p>
             <a:r>
-              <a:rPr lang="en-US" dirty="0" smtClean="0"/>
+              <a:rPr lang="en-US" dirty="0"/>
               <a:t> </a:t>
             </a:r>
-            <a:endParaRPr lang="en-US" dirty="0"/>
           </a:p>
         </p:txBody>
       </p:sp>
@@ -3573,18 +3558,13 @@
           <a:lstStyle/>
           <a:p>
             <a:r>
-              <a:rPr lang="en-US" sz="4400" b="1" dirty="0" smtClean="0">
+              <a:rPr lang="en-US" sz="4400" b="1" dirty="0">
                 <a:solidFill>
                   <a:schemeClr val="bg1"/>
                 </a:solidFill>
               </a:rPr>
               <a:t>@</a:t>
             </a:r>
-            <a:endParaRPr lang="en-US" sz="4400" b="1" dirty="0">
-              <a:solidFill>
-                <a:schemeClr val="bg1"/>
-              </a:solidFill>
-            </a:endParaRPr>
           </a:p>
         </p:txBody>
       </p:sp>
@@ -3648,7 +3628,7 @@
           </a:lstStyle>
           <a:p>
             <a:r>
-              <a:rPr lang="en-US" smtClean="0"/>
+              <a:rPr lang="en-US"/>
               <a:t> </a:t>
             </a:r>
             <a:endParaRPr lang="en-US" dirty="0"/>
@@ -3746,7 +3726,7 @@
           </a:lstStyle>
           <a:p>
             <a:r>
-              <a:rPr lang="en-US" smtClean="0"/>
+              <a:rPr lang="en-US"/>
               <a:t> </a:t>
             </a:r>
             <a:endParaRPr lang="en-US" dirty="0"/>
@@ -3776,20 +3756,19 @@
           <a:lstStyle/>
           <a:p>
             <a:r>
-              <a:rPr lang="en-US" sz="1200" b="1" dirty="0" smtClean="0"/>
+              <a:rPr lang="en-US" sz="1200" b="1" dirty="0"/>
               <a:t>Why become</a:t>
             </a:r>
           </a:p>
           <a:p>
             <a:r>
-              <a:rPr lang="en-US" sz="1200" b="1" dirty="0" err="1" smtClean="0"/>
+              <a:rPr lang="en-US" sz="1200" b="1" dirty="0" err="1"/>
               <a:t>you@ncstate.edu</a:t>
             </a:r>
             <a:r>
-              <a:rPr lang="en-US" sz="1200" b="1" dirty="0" smtClean="0"/>
+              <a:rPr lang="en-US" sz="1200" b="1" dirty="0"/>
               <a:t>?</a:t>
             </a:r>
-            <a:endParaRPr lang="en-US" sz="1200" b="1" dirty="0"/>
           </a:p>
         </p:txBody>
       </p:sp>
@@ -3851,21 +3830,21 @@
           <a:lstStyle/>
           <a:p>
             <a:r>
-              <a:rPr lang="en-US" sz="1000" b="1" dirty="0" smtClean="0">
+              <a:rPr lang="en-US" sz="1000" b="1" dirty="0">
                 <a:solidFill>
                   <a:srgbClr val="CD1F28"/>
                 </a:solidFill>
               </a:rPr>
-              <a:t>Active SE Faculty</a:t>
+              <a:t>Active SE faculty</a:t>
             </a:r>
             <a:br>
-              <a:rPr lang="en-US" sz="1000" b="1" dirty="0" smtClean="0">
+              <a:rPr lang="en-US" sz="1000" b="1" dirty="0">
                 <a:solidFill>
                   <a:srgbClr val="CD1F28"/>
                 </a:solidFill>
               </a:rPr>
             </a:br>
-            <a:endParaRPr lang="en-US" sz="800" b="1" dirty="0" smtClean="0">
+            <a:endParaRPr lang="en-US" sz="800" b="1" dirty="0">
               <a:solidFill>
                 <a:srgbClr val="CD1F28"/>
               </a:solidFill>
@@ -3873,55 +3852,30 @@
           </a:p>
           <a:p>
             <a:r>
-              <a:rPr lang="en-US" sz="900" dirty="0" smtClean="0"/>
-              <a:t>• </a:t>
-            </a:r>
-            <a:r>
-              <a:rPr lang="en-US" sz="900" dirty="0" smtClean="0"/>
-              <a:t>Laurie </a:t>
-            </a:r>
-            <a:r>
-              <a:rPr lang="en-US" sz="900" dirty="0" err="1" smtClean="0"/>
-              <a:t>Willliams</a:t>
-            </a:r>
-            <a:r>
-              <a:rPr lang="en-US" sz="900" dirty="0" smtClean="0"/>
-              <a:t>, Tim </a:t>
-            </a:r>
-            <a:r>
-              <a:rPr lang="en-US" sz="900" dirty="0" err="1" smtClean="0"/>
-              <a:t>Menzies</a:t>
-            </a:r>
-            <a:endParaRPr lang="en-US" sz="900" dirty="0" smtClean="0"/>
-          </a:p>
-          <a:p>
-            <a:r>
-              <a:rPr lang="en-US" sz="900" dirty="0" smtClean="0"/>
+              <a:rPr lang="en-US" sz="900" dirty="0"/>
+              <a:t>• Laurie Williams, Tim Menzies</a:t>
+            </a:r>
+          </a:p>
+          <a:p>
+            <a:r>
+              <a:rPr lang="en-US" sz="900" dirty="0"/>
               <a:t>• Emerson Murphy-Hill</a:t>
             </a:r>
           </a:p>
           <a:p>
             <a:r>
-              <a:rPr lang="en-US" sz="900" dirty="0" smtClean="0"/>
-              <a:t>• Chris </a:t>
-            </a:r>
-            <a:r>
-              <a:rPr lang="en-US" sz="900" dirty="0" err="1" smtClean="0"/>
-              <a:t>Parin</a:t>
-            </a:r>
-            <a:r>
-              <a:rPr lang="en-US" sz="900" dirty="0" smtClean="0"/>
-              <a:t>, Kathryn </a:t>
-            </a:r>
-            <a:r>
-              <a:rPr lang="en-US" sz="900" dirty="0" err="1" smtClean="0"/>
+              <a:rPr lang="en-US" sz="900" dirty="0"/>
+              <a:t>• Chris Parnin, Kathryn </a:t>
+            </a:r>
+            <a:r>
+              <a:rPr lang="en-US" sz="900" dirty="0" err="1"/>
               <a:t>Stolee</a:t>
             </a:r>
-            <a:endParaRPr lang="en-US" sz="900" dirty="0" smtClean="0"/>
-          </a:p>
-          <a:p>
-            <a:r>
-              <a:rPr lang="en-US" sz="900" dirty="0" smtClean="0"/>
+            <a:endParaRPr lang="en-US" sz="900" dirty="0"/>
+          </a:p>
+          <a:p>
+            <a:r>
+              <a:rPr lang="en-US" sz="900" dirty="0"/>
               <a:t>• Sarah Heckman, Jason King</a:t>
             </a:r>
           </a:p>
@@ -3931,7 +3885,7 @@
                 <a:spcPts val="780"/>
               </a:lnSpc>
             </a:pPr>
-            <a:endParaRPr lang="en-US" sz="900" dirty="0" smtClean="0"/>
+            <a:endParaRPr lang="en-US" sz="900" dirty="0"/>
           </a:p>
           <a:p>
             <a:pPr>
@@ -3939,7 +3893,7 @@
                 <a:spcPts val="780"/>
               </a:lnSpc>
             </a:pPr>
-            <a:endParaRPr lang="en-US" sz="900" dirty="0" smtClean="0"/>
+            <a:endParaRPr lang="en-US" sz="900" dirty="0"/>
           </a:p>
         </p:txBody>
       </p:sp>
@@ -4001,7 +3955,7 @@
           <a:lstStyle/>
           <a:p>
             <a:r>
-              <a:rPr lang="en-US" sz="1000" b="1" dirty="0" smtClean="0">
+              <a:rPr lang="en-US" sz="1000" b="1" dirty="0">
                 <a:solidFill>
                   <a:srgbClr val="CD1F28"/>
                 </a:solidFill>
@@ -4009,13 +3963,13 @@
               <a:t>Local industrial partners</a:t>
             </a:r>
             <a:br>
-              <a:rPr lang="en-US" sz="1000" b="1" dirty="0" smtClean="0">
+              <a:rPr lang="en-US" sz="1000" b="1" dirty="0">
                 <a:solidFill>
                   <a:srgbClr val="CD1F28"/>
                 </a:solidFill>
               </a:rPr>
             </a:br>
-            <a:endParaRPr lang="en-US" sz="800" b="1" dirty="0" smtClean="0">
+            <a:endParaRPr lang="en-US" sz="800" b="1" dirty="0">
               <a:solidFill>
                 <a:srgbClr val="CD1F28"/>
               </a:solidFill>
@@ -4023,42 +3977,29 @@
           </a:p>
           <a:p>
             <a:r>
-              <a:rPr lang="en-US" sz="900" dirty="0" smtClean="0"/>
-              <a:t>• </a:t>
-            </a:r>
-            <a:r>
-              <a:rPr lang="en-US" sz="900" dirty="0" smtClean="0"/>
-              <a:t>On the same campus</a:t>
+              <a:rPr lang="en-US" sz="900" dirty="0"/>
+              <a:t>• On the same campus</a:t>
             </a:r>
             <a:br>
-              <a:rPr lang="en-US" sz="900" dirty="0" smtClean="0"/>
+              <a:rPr lang="en-US" sz="900" dirty="0"/>
             </a:br>
             <a:r>
-              <a:rPr lang="en-US" sz="900" dirty="0" smtClean="0"/>
+              <a:rPr lang="en-US" sz="900" dirty="0"/>
               <a:t>        - ABB, LexisNexis,…</a:t>
             </a:r>
           </a:p>
           <a:p>
             <a:r>
-              <a:rPr lang="en-US" sz="900" dirty="0" smtClean="0"/>
-              <a:t>• Locally at Research</a:t>
-            </a:r>
-            <a:r>
               <a:rPr lang="en-US" sz="900" dirty="0"/>
-              <a:t> </a:t>
-            </a:r>
-            <a:r>
-              <a:rPr lang="en-US" sz="900" dirty="0" smtClean="0"/>
-              <a:t>Triangle</a:t>
+              <a:t>• Locally at Research Triangle</a:t>
             </a:r>
             <a:br>
-              <a:rPr lang="en-US" sz="900" dirty="0" smtClean="0"/>
+              <a:rPr lang="en-US" sz="900" dirty="0"/>
             </a:br>
             <a:r>
-              <a:rPr lang="en-US" sz="900" dirty="0" smtClean="0"/>
+              <a:rPr lang="en-US" sz="900" dirty="0"/>
               <a:t>         - IBM, CISCO, MetLife, …</a:t>
             </a:r>
-            <a:endParaRPr lang="en-US" sz="900" dirty="0" smtClean="0"/>
           </a:p>
         </p:txBody>
       </p:sp>
@@ -4120,7 +4061,7 @@
           <a:lstStyle/>
           <a:p>
             <a:r>
-              <a:rPr lang="en-US" sz="1000" b="1" dirty="0" smtClean="0">
+              <a:rPr lang="en-US" sz="1000" b="1" dirty="0">
                 <a:solidFill>
                   <a:srgbClr val="CD1F28"/>
                 </a:solidFill>
@@ -4128,13 +4069,13 @@
               <a:t>Vibrant Ph.D. community</a:t>
             </a:r>
             <a:br>
-              <a:rPr lang="en-US" sz="1000" b="1" dirty="0" smtClean="0">
+              <a:rPr lang="en-US" sz="1000" b="1" dirty="0">
                 <a:solidFill>
                   <a:srgbClr val="CD1F28"/>
                 </a:solidFill>
               </a:rPr>
             </a:br>
-            <a:endParaRPr lang="en-US" sz="800" b="1" dirty="0" smtClean="0">
+            <a:endParaRPr lang="en-US" sz="800" b="1" dirty="0">
               <a:solidFill>
                 <a:srgbClr val="CD1F28"/>
               </a:solidFill>
@@ -4142,34 +4083,29 @@
           </a:p>
           <a:p>
             <a:r>
-              <a:rPr lang="en-US" sz="900" dirty="0" smtClean="0"/>
-              <a:t>• </a:t>
-            </a:r>
-            <a:r>
-              <a:rPr lang="en-US" sz="900" dirty="0" smtClean="0"/>
-              <a:t>20+ </a:t>
-            </a:r>
-            <a:r>
-              <a:rPr lang="en-US" sz="900" dirty="0" err="1" smtClean="0"/>
+              <a:rPr lang="en-US" sz="900" dirty="0"/>
+              <a:t>• 20+ </a:t>
+            </a:r>
+            <a:r>
+              <a:rPr lang="en-US" sz="900" dirty="0" err="1"/>
               <a:t>Ph.D.s</a:t>
             </a:r>
             <a:r>
-              <a:rPr lang="en-US" sz="900" dirty="0" smtClean="0"/>
+              <a:rPr lang="en-US" sz="900" dirty="0"/>
               <a:t> in SE</a:t>
             </a:r>
           </a:p>
           <a:p>
             <a:r>
-              <a:rPr lang="en-US" sz="900" dirty="0" smtClean="0"/>
+              <a:rPr lang="en-US" sz="900" dirty="0"/>
               <a:t>• 4 years of TA support</a:t>
             </a:r>
           </a:p>
           <a:p>
             <a:r>
-              <a:rPr lang="en-US" sz="900" dirty="0" smtClean="0"/>
+              <a:rPr lang="en-US" sz="900" dirty="0"/>
               <a:t>• NSF funded REU</a:t>
             </a:r>
-            <a:endParaRPr lang="en-US" sz="900" dirty="0" smtClean="0"/>
           </a:p>
         </p:txBody>
       </p:sp>
@@ -4227,7 +4163,7 @@
           </a:bodyPr>
           <a:lstStyle/>
           <a:p>
-            <a:endParaRPr lang="en-US" sz="1000" b="1" dirty="0" smtClean="0">
+            <a:endParaRPr lang="en-US" sz="1000" b="1" dirty="0">
               <a:solidFill>
                 <a:schemeClr val="bg1"/>
               </a:solidFill>
@@ -4235,7 +4171,7 @@
           </a:p>
           <a:p>
             <a:r>
-              <a:rPr lang="en-US" sz="1000" b="1" dirty="0" smtClean="0">
+              <a:rPr lang="en-US" sz="1000" b="1" dirty="0">
                 <a:solidFill>
                   <a:schemeClr val="bg1"/>
                 </a:solidFill>
@@ -4243,13 +4179,13 @@
               <a:t>Learn more!</a:t>
             </a:r>
             <a:br>
-              <a:rPr lang="en-US" sz="1000" b="1" dirty="0" smtClean="0">
+              <a:rPr lang="en-US" sz="1000" b="1" dirty="0">
                 <a:solidFill>
                   <a:schemeClr val="bg1"/>
                 </a:solidFill>
               </a:rPr>
             </a:br>
-            <a:endParaRPr lang="en-US" sz="1000" b="1" dirty="0" smtClean="0">
+            <a:endParaRPr lang="en-US" sz="1000" b="1" dirty="0">
               <a:solidFill>
                 <a:schemeClr val="bg1"/>
               </a:solidFill>
@@ -4257,25 +4193,17 @@
           </a:p>
           <a:p>
             <a:r>
-              <a:rPr lang="en-US" sz="1000" dirty="0" smtClean="0">
+              <a:rPr lang="en-US" sz="1000" dirty="0">
                 <a:solidFill>
                   <a:schemeClr val="bg1"/>
                 </a:solidFill>
               </a:rPr>
-              <a:t>• </a:t>
-            </a:r>
-            <a:r>
-              <a:rPr lang="en-US" sz="1000" dirty="0" smtClean="0">
-                <a:solidFill>
-                  <a:schemeClr val="bg1"/>
-                </a:solidFill>
-              </a:rPr>
-              <a:t>Visit us, give a talk!</a:t>
-            </a:r>
-          </a:p>
-          <a:p>
-            <a:r>
-              <a:rPr lang="en-US" sz="1000" dirty="0" smtClean="0">
+              <a:t>• Visit us, give a talk!</a:t>
+            </a:r>
+          </a:p>
+          <a:p>
+            <a:r>
+              <a:rPr lang="en-US" sz="1000" dirty="0">
                 <a:solidFill>
                   <a:schemeClr val="bg1"/>
                 </a:solidFill>
@@ -4283,14 +4211,14 @@
               <a:t>• Contact us!</a:t>
             </a:r>
             <a:br>
-              <a:rPr lang="en-US" sz="1000" dirty="0" smtClean="0">
+              <a:rPr lang="en-US" sz="1000" dirty="0">
                 <a:solidFill>
                   <a:schemeClr val="bg1"/>
                 </a:solidFill>
               </a:rPr>
             </a:br>
             <a:r>
-              <a:rPr lang="en-US" sz="1000" dirty="0" smtClean="0">
+              <a:rPr lang="en-US" sz="1000" dirty="0">
                 <a:solidFill>
                   <a:schemeClr val="bg1"/>
                 </a:solidFill>
@@ -4298,7 +4226,7 @@
               <a:t>   </a:t>
             </a:r>
             <a:r>
-              <a:rPr lang="en-US" sz="1000" dirty="0" err="1" smtClean="0">
+              <a:rPr lang="en-US" sz="1000" dirty="0" err="1">
                 <a:solidFill>
                   <a:schemeClr val="bg1"/>
                 </a:solidFill>
@@ -4306,7 +4234,7 @@
               <a:t>williams@csc.ncsu.edu</a:t>
             </a:r>
             <a:r>
-              <a:rPr lang="en-US" sz="1000" dirty="0" smtClean="0">
+              <a:rPr lang="en-US" sz="1000" dirty="0">
                 <a:solidFill>
                   <a:schemeClr val="bg1"/>
                 </a:solidFill>
@@ -4316,7 +4244,7 @@
             <a:endParaRPr lang="en-US" sz="1000" dirty="0"/>
           </a:p>
           <a:p>
-            <a:endParaRPr lang="en-US" sz="900" dirty="0" smtClean="0"/>
+            <a:endParaRPr lang="en-US" sz="900" dirty="0"/>
           </a:p>
           <a:p>
             <a:endParaRPr lang="en-US" sz="900" dirty="0"/>

</xml_diff>

<commit_message>
typos fixed, contact emails added
</commit_message>
<xml_diff>
--- a/img/bookmark.pptx
+++ b/img/bookmark.pptx
@@ -107,6 +107,14 @@
       </a:defRPr>
     </a:lvl9pPr>
   </p:defaultTextStyle>
+  <p:extLst>
+    <p:ext uri="{EFAFB233-063F-42B5-8137-9DF3F51BA10A}">
+      <p15:sldGuideLst xmlns:p15="http://schemas.microsoft.com/office/powerpoint/2012/main"/>
+    </p:ext>
+    <p:ext uri="{2D200454-40CA-4A62-9FC3-DE9A4176ACB9}">
+      <p15:notesGuideLst xmlns:p15="http://schemas.microsoft.com/office/powerpoint/2012/main"/>
+    </p:ext>
+  </p:extLst>
 </p:presentation>
 </file>
 
@@ -192,7 +200,7 @@
           <a:p>
             <a:fld id="{46F07AF3-871D-6C4A-8794-EA70F00191D8}" type="datetimeFigureOut">
               <a:rPr lang="en-US" smtClean="0"/>
-              <a:t>4/19/16</a:t>
+              <a:t>4/20/16</a:t>
             </a:fld>
             <a:endParaRPr lang="en-US"/>
           </a:p>
@@ -675,7 +683,7 @@
           <a:p>
             <a:fld id="{B540673F-1357-9443-ADCA-90B5455D5376}" type="datetimeFigureOut">
               <a:rPr lang="en-US" smtClean="0"/>
-              <a:t>4/19/16</a:t>
+              <a:t>4/20/16</a:t>
             </a:fld>
             <a:endParaRPr lang="en-US"/>
           </a:p>
@@ -845,7 +853,7 @@
           <a:p>
             <a:fld id="{B540673F-1357-9443-ADCA-90B5455D5376}" type="datetimeFigureOut">
               <a:rPr lang="en-US" smtClean="0"/>
-              <a:t>4/19/16</a:t>
+              <a:t>4/20/16</a:t>
             </a:fld>
             <a:endParaRPr lang="en-US"/>
           </a:p>
@@ -1025,7 +1033,7 @@
           <a:p>
             <a:fld id="{B540673F-1357-9443-ADCA-90B5455D5376}" type="datetimeFigureOut">
               <a:rPr lang="en-US" smtClean="0"/>
-              <a:t>4/19/16</a:t>
+              <a:t>4/20/16</a:t>
             </a:fld>
             <a:endParaRPr lang="en-US"/>
           </a:p>
@@ -1195,7 +1203,7 @@
           <a:p>
             <a:fld id="{B540673F-1357-9443-ADCA-90B5455D5376}" type="datetimeFigureOut">
               <a:rPr lang="en-US" smtClean="0"/>
-              <a:t>4/19/16</a:t>
+              <a:t>4/20/16</a:t>
             </a:fld>
             <a:endParaRPr lang="en-US"/>
           </a:p>
@@ -1441,7 +1449,7 @@
           <a:p>
             <a:fld id="{B540673F-1357-9443-ADCA-90B5455D5376}" type="datetimeFigureOut">
               <a:rPr lang="en-US" smtClean="0"/>
-              <a:t>4/19/16</a:t>
+              <a:t>4/20/16</a:t>
             </a:fld>
             <a:endParaRPr lang="en-US"/>
           </a:p>
@@ -1673,7 +1681,7 @@
           <a:p>
             <a:fld id="{B540673F-1357-9443-ADCA-90B5455D5376}" type="datetimeFigureOut">
               <a:rPr lang="en-US" smtClean="0"/>
-              <a:t>4/19/16</a:t>
+              <a:t>4/20/16</a:t>
             </a:fld>
             <a:endParaRPr lang="en-US"/>
           </a:p>
@@ -2040,7 +2048,7 @@
           <a:p>
             <a:fld id="{B540673F-1357-9443-ADCA-90B5455D5376}" type="datetimeFigureOut">
               <a:rPr lang="en-US" smtClean="0"/>
-              <a:t>4/19/16</a:t>
+              <a:t>4/20/16</a:t>
             </a:fld>
             <a:endParaRPr lang="en-US"/>
           </a:p>
@@ -2158,7 +2166,7 @@
           <a:p>
             <a:fld id="{B540673F-1357-9443-ADCA-90B5455D5376}" type="datetimeFigureOut">
               <a:rPr lang="en-US" smtClean="0"/>
-              <a:t>4/19/16</a:t>
+              <a:t>4/20/16</a:t>
             </a:fld>
             <a:endParaRPr lang="en-US"/>
           </a:p>
@@ -2253,7 +2261,7 @@
           <a:p>
             <a:fld id="{B540673F-1357-9443-ADCA-90B5455D5376}" type="datetimeFigureOut">
               <a:rPr lang="en-US" smtClean="0"/>
-              <a:t>4/19/16</a:t>
+              <a:t>4/20/16</a:t>
             </a:fld>
             <a:endParaRPr lang="en-US"/>
           </a:p>
@@ -2530,7 +2538,7 @@
           <a:p>
             <a:fld id="{B540673F-1357-9443-ADCA-90B5455D5376}" type="datetimeFigureOut">
               <a:rPr lang="en-US" smtClean="0"/>
-              <a:t>4/19/16</a:t>
+              <a:t>4/20/16</a:t>
             </a:fld>
             <a:endParaRPr lang="en-US"/>
           </a:p>
@@ -2783,7 +2791,7 @@
           <a:p>
             <a:fld id="{B540673F-1357-9443-ADCA-90B5455D5376}" type="datetimeFigureOut">
               <a:rPr lang="en-US" smtClean="0"/>
-              <a:t>4/19/16</a:t>
+              <a:t>4/20/16</a:t>
             </a:fld>
             <a:endParaRPr lang="en-US"/>
           </a:p>
@@ -2996,7 +3004,7 @@
           <a:p>
             <a:fld id="{B540673F-1357-9443-ADCA-90B5455D5376}" type="datetimeFigureOut">
               <a:rPr lang="en-US" smtClean="0"/>
-              <a:t>4/19/16</a:t>
+              <a:t>4/20/16</a:t>
             </a:fld>
             <a:endParaRPr lang="en-US"/>
           </a:p>
@@ -3761,8 +3769,8 @@
         </p:nvSpPr>
         <p:spPr>
           <a:xfrm>
-            <a:off x="1244186" y="2982343"/>
-            <a:ext cx="1375826" cy="461665"/>
+            <a:off x="1218786" y="2880743"/>
+            <a:ext cx="1207446" cy="646331"/>
           </a:xfrm>
           <a:prstGeom prst="rect">
             <a:avLst/>
@@ -3777,13 +3785,25 @@
           <a:p>
             <a:r>
               <a:rPr lang="en-US" sz="1200" b="1" dirty="0" smtClean="0"/>
-              <a:t>Why become</a:t>
-            </a:r>
+              <a:t>Why </a:t>
+            </a:r>
+            <a:r>
+              <a:rPr lang="en-US" sz="1200" b="1" dirty="0" smtClean="0"/>
+              <a:t/>
+            </a:r>
+            <a:br>
+              <a:rPr lang="en-US" sz="1200" b="1" dirty="0" smtClean="0"/>
+            </a:br>
+            <a:r>
+              <a:rPr lang="en-US" sz="1200" b="1" dirty="0" smtClean="0"/>
+              <a:t>become</a:t>
+            </a:r>
+            <a:endParaRPr lang="en-US" sz="1200" b="1" dirty="0" smtClean="0"/>
           </a:p>
           <a:p>
             <a:r>
               <a:rPr lang="en-US" sz="1200" b="1" dirty="0" err="1" smtClean="0"/>
-              <a:t>you@ncstate.edu</a:t>
+              <a:t>you@ncsu.edu</a:t>
             </a:r>
             <a:r>
               <a:rPr lang="en-US" sz="1200" b="1" dirty="0" smtClean="0"/>
@@ -3801,7 +3821,7 @@
         </p:nvCxnSpPr>
         <p:spPr>
           <a:xfrm>
-            <a:off x="2607281" y="2695120"/>
+            <a:off x="2385031" y="2695120"/>
             <a:ext cx="0" cy="1180750"/>
           </a:xfrm>
           <a:prstGeom prst="line">
@@ -3836,7 +3856,7 @@
         </p:nvSpPr>
         <p:spPr>
           <a:xfrm>
-            <a:off x="2559050" y="2776573"/>
+            <a:off x="2343150" y="2776573"/>
             <a:ext cx="1662635" cy="1128514"/>
           </a:xfrm>
           <a:prstGeom prst="rect">
@@ -3874,15 +3894,11 @@
           <a:p>
             <a:r>
               <a:rPr lang="en-US" sz="900" dirty="0" smtClean="0"/>
-              <a:t>• </a:t>
+              <a:t>• Laurie </a:t>
             </a:r>
             <a:r>
               <a:rPr lang="en-US" sz="900" dirty="0" smtClean="0"/>
-              <a:t>Laurie </a:t>
-            </a:r>
-            <a:r>
-              <a:rPr lang="en-US" sz="900" dirty="0" err="1" smtClean="0"/>
-              <a:t>Willliams</a:t>
+              <a:t>Williams</a:t>
             </a:r>
             <a:r>
               <a:rPr lang="en-US" sz="900" dirty="0" smtClean="0"/>
@@ -3907,7 +3923,7 @@
             </a:r>
             <a:r>
               <a:rPr lang="en-US" sz="900" dirty="0" err="1" smtClean="0"/>
-              <a:t>Parin</a:t>
+              <a:t>Parnin</a:t>
             </a:r>
             <a:r>
               <a:rPr lang="en-US" sz="900" dirty="0" smtClean="0"/>
@@ -3951,7 +3967,7 @@
         </p:nvCxnSpPr>
         <p:spPr>
           <a:xfrm>
-            <a:off x="4188431" y="2630698"/>
+            <a:off x="3915381" y="2630698"/>
             <a:ext cx="0" cy="1180750"/>
           </a:xfrm>
           <a:prstGeom prst="line">
@@ -3986,7 +4002,7 @@
         </p:nvSpPr>
         <p:spPr>
           <a:xfrm>
-            <a:off x="4159250" y="2776573"/>
+            <a:off x="3892550" y="2776573"/>
             <a:ext cx="1555234" cy="923330"/>
           </a:xfrm>
           <a:prstGeom prst="rect">
@@ -4024,11 +4040,7 @@
           <a:p>
             <a:r>
               <a:rPr lang="en-US" sz="900" dirty="0" smtClean="0"/>
-              <a:t>• </a:t>
-            </a:r>
-            <a:r>
-              <a:rPr lang="en-US" sz="900" dirty="0" smtClean="0"/>
-              <a:t>On the same campus</a:t>
+              <a:t>• On the same campus</a:t>
             </a:r>
             <a:br>
               <a:rPr lang="en-US" sz="900" dirty="0" smtClean="0"/>
@@ -4058,7 +4070,6 @@
               <a:rPr lang="en-US" sz="900" dirty="0" smtClean="0"/>
               <a:t>         - IBM, CISCO, MetLife, …</a:t>
             </a:r>
-            <a:endParaRPr lang="en-US" sz="900" dirty="0" smtClean="0"/>
           </a:p>
         </p:txBody>
       </p:sp>
@@ -4070,7 +4081,7 @@
         </p:nvCxnSpPr>
         <p:spPr>
           <a:xfrm>
-            <a:off x="5699731" y="2643398"/>
+            <a:off x="5420331" y="2643398"/>
             <a:ext cx="0" cy="1180750"/>
           </a:xfrm>
           <a:prstGeom prst="line">
@@ -4105,7 +4116,7 @@
         </p:nvSpPr>
         <p:spPr>
           <a:xfrm>
-            <a:off x="5670550" y="2782923"/>
+            <a:off x="5386852" y="2790558"/>
             <a:ext cx="1531188" cy="784830"/>
           </a:xfrm>
           <a:prstGeom prst="rect">
@@ -4143,11 +4154,7 @@
           <a:p>
             <a:r>
               <a:rPr lang="en-US" sz="900" dirty="0" smtClean="0"/>
-              <a:t>• </a:t>
-            </a:r>
-            <a:r>
-              <a:rPr lang="en-US" sz="900" dirty="0" smtClean="0"/>
-              <a:t>20+ </a:t>
+              <a:t>• 20+ </a:t>
             </a:r>
             <a:r>
               <a:rPr lang="en-US" sz="900" dirty="0" err="1" smtClean="0"/>
@@ -4169,7 +4176,6 @@
               <a:rPr lang="en-US" sz="900" dirty="0" smtClean="0"/>
               <a:t>• NSF funded REU</a:t>
             </a:r>
-            <a:endParaRPr lang="en-US" sz="900" dirty="0" smtClean="0"/>
           </a:p>
         </p:txBody>
       </p:sp>
@@ -4211,8 +4217,8 @@
         </p:nvSpPr>
         <p:spPr>
           <a:xfrm>
-            <a:off x="7134408" y="2637048"/>
-            <a:ext cx="1578629" cy="1292662"/>
+            <a:off x="6841552" y="2637048"/>
+            <a:ext cx="1884186" cy="1292662"/>
           </a:xfrm>
           <a:prstGeom prst="rect">
             <a:avLst/>
@@ -4240,7 +4246,15 @@
                   <a:schemeClr val="bg1"/>
                 </a:solidFill>
               </a:rPr>
-              <a:t>Learn more!</a:t>
+              <a:t>Learn more</a:t>
+            </a:r>
+            <a:r>
+              <a:rPr lang="en-US" sz="1000" b="1" dirty="0" smtClean="0">
+                <a:solidFill>
+                  <a:schemeClr val="bg1"/>
+                </a:solidFill>
+              </a:rPr>
+              <a:t>!</a:t>
             </a:r>
             <a:br>
               <a:rPr lang="en-US" sz="1000" b="1" dirty="0" smtClean="0">
@@ -4256,6 +4270,11 @@
             </a:endParaRPr>
           </a:p>
           <a:p>
+            <a:pPr>
+              <a:lnSpc>
+                <a:spcPts val="880"/>
+              </a:lnSpc>
+            </a:pPr>
             <a:r>
               <a:rPr lang="en-US" sz="1000" dirty="0" smtClean="0">
                 <a:solidFill>
@@ -4270,35 +4289,135 @@
                   <a:schemeClr val="bg1"/>
                 </a:solidFill>
               </a:rPr>
-              <a:t>Visit us, give a talk!</a:t>
-            </a:r>
-          </a:p>
-          <a:p>
-            <a:r>
-              <a:rPr lang="en-US" sz="1000" dirty="0" smtClean="0">
+              <a:t> </a:t>
+            </a:r>
+            <a:r>
+              <a:rPr lang="en-US" sz="900" dirty="0" smtClean="0">
                 <a:solidFill>
                   <a:schemeClr val="bg1"/>
                 </a:solidFill>
               </a:rPr>
-              <a:t>• Contact us!</a:t>
+              <a:t>Visit </a:t>
+            </a:r>
+            <a:r>
+              <a:rPr lang="en-US" sz="900" dirty="0" smtClean="0">
+                <a:solidFill>
+                  <a:schemeClr val="bg1"/>
+                </a:solidFill>
+              </a:rPr>
+              <a:t>us, give a talk</a:t>
+            </a:r>
+            <a:r>
+              <a:rPr lang="en-US" sz="900" dirty="0" smtClean="0">
+                <a:solidFill>
+                  <a:schemeClr val="bg1"/>
+                </a:solidFill>
+              </a:rPr>
+              <a:t>!</a:t>
+            </a:r>
+          </a:p>
+          <a:p>
+            <a:pPr>
+              <a:lnSpc>
+                <a:spcPts val="880"/>
+              </a:lnSpc>
+            </a:pPr>
+            <a:r>
+              <a:rPr lang="en-US" sz="900" dirty="0">
+                <a:solidFill>
+                  <a:schemeClr val="bg1"/>
+                </a:solidFill>
+              </a:rPr>
+              <a:t>• </a:t>
+            </a:r>
+            <a:r>
+              <a:rPr lang="en-US" sz="900" dirty="0" smtClean="0">
+                <a:solidFill>
+                  <a:schemeClr val="bg1"/>
+                </a:solidFill>
+              </a:rPr>
+              <a:t> Apply </a:t>
+            </a:r>
+            <a:r>
+              <a:rPr lang="en-US" sz="900" dirty="0">
+                <a:solidFill>
+                  <a:schemeClr val="bg1"/>
+                </a:solidFill>
+              </a:rPr>
+              <a:t>for </a:t>
+            </a:r>
+            <a:r>
+              <a:rPr lang="en-US" sz="900" dirty="0" smtClean="0">
+                <a:solidFill>
+                  <a:schemeClr val="bg1"/>
+                </a:solidFill>
+              </a:rPr>
+              <a:t>study!  </a:t>
             </a:r>
             <a:br>
-              <a:rPr lang="en-US" sz="1000" dirty="0" smtClean="0">
+              <a:rPr lang="en-US" sz="900" dirty="0" smtClean="0">
                 <a:solidFill>
                   <a:schemeClr val="bg1"/>
                 </a:solidFill>
               </a:rPr>
             </a:br>
             <a:r>
-              <a:rPr lang="en-US" sz="1000" dirty="0" smtClean="0">
+              <a:rPr lang="en-US" sz="900" dirty="0">
                 <a:solidFill>
                   <a:schemeClr val="bg1"/>
                 </a:solidFill>
               </a:rPr>
-              <a:t>   </a:t>
-            </a:r>
-            <a:r>
-              <a:rPr lang="en-US" sz="1000" dirty="0" err="1" smtClean="0">
+              <a:t>    http://</a:t>
+            </a:r>
+            <a:r>
+              <a:rPr lang="en-US" sz="900" dirty="0" err="1" smtClean="0">
+                <a:solidFill>
+                  <a:schemeClr val="bg1"/>
+                </a:solidFill>
+              </a:rPr>
+              <a:t>tiny.cc</a:t>
+            </a:r>
+            <a:r>
+              <a:rPr lang="en-US" sz="900" dirty="0" smtClean="0">
+                <a:solidFill>
+                  <a:schemeClr val="bg1"/>
+                </a:solidFill>
+              </a:rPr>
+              <a:t>/</a:t>
+            </a:r>
+            <a:r>
+              <a:rPr lang="en-US" sz="900" dirty="0" err="1" smtClean="0">
+                <a:solidFill>
+                  <a:schemeClr val="bg1"/>
+                </a:solidFill>
+              </a:rPr>
+              <a:t>applync</a:t>
+            </a:r>
+            <a:r>
+              <a:rPr lang="en-US" sz="900" dirty="0" smtClean="0">
+                <a:solidFill>
+                  <a:schemeClr val="bg1"/>
+                </a:solidFill>
+              </a:rPr>
+              <a:t/>
+            </a:r>
+            <a:br>
+              <a:rPr lang="en-US" sz="900" dirty="0" smtClean="0">
+                <a:solidFill>
+                  <a:schemeClr val="bg1"/>
+                </a:solidFill>
+              </a:rPr>
+            </a:br>
+            <a:r>
+              <a:rPr lang="en-US" sz="900" dirty="0" smtClean="0">
+                <a:solidFill>
+                  <a:schemeClr val="bg1"/>
+                </a:solidFill>
+              </a:rPr>
+              <a:t>•  Contact: </a:t>
+            </a:r>
+            <a:r>
+              <a:rPr lang="en-US" sz="900" dirty="0" err="1" smtClean="0">
                 <a:solidFill>
                   <a:schemeClr val="bg1"/>
                 </a:solidFill>
@@ -4306,14 +4425,14 @@
               <a:t>williams@csc.ncsu.edu</a:t>
             </a:r>
             <a:r>
-              <a:rPr lang="en-US" sz="1000" dirty="0" smtClean="0">
+              <a:rPr lang="en-US" sz="900" dirty="0" smtClean="0">
                 <a:solidFill>
                   <a:schemeClr val="bg1"/>
                 </a:solidFill>
               </a:rPr>
-              <a:t> </a:t>
-            </a:r>
-            <a:endParaRPr lang="en-US" sz="1000" dirty="0"/>
+              <a:t>  </a:t>
+            </a:r>
+            <a:endParaRPr lang="en-US" sz="900" dirty="0"/>
           </a:p>
           <a:p>
             <a:endParaRPr lang="en-US" sz="900" dirty="0" smtClean="0"/>

</xml_diff>